<commit_message>
Final version of basic project description, added game rules, UI proposal and simple class description
</commit_message>
<xml_diff>
--- a/doc/gameUI.pptx
+++ b/doc/gameUI.pptx
@@ -4269,10 +4269,10 @@
       </p:grpSpPr>
       <p:sp>
         <p:nvSpPr>
-          <p:cNvPr id="4" name="Rectangle 3">
-            <a:extLst>
-              <a:ext uri="{FF2B5EF4-FFF2-40B4-BE49-F238E27FC236}">
-                <a16:creationId xmlns:a16="http://schemas.microsoft.com/office/drawing/2014/main" id="{29531341-C931-45A9-83CC-96BA45870DDF}"/>
+          <p:cNvPr id="14" name="Rectangle 13">
+            <a:extLst>
+              <a:ext uri="{FF2B5EF4-FFF2-40B4-BE49-F238E27FC236}">
+                <a16:creationId xmlns:a16="http://schemas.microsoft.com/office/drawing/2014/main" id="{B91E746D-4FC7-4245-9F78-BA2525F744A9}"/>
               </a:ext>
             </a:extLst>
           </p:cNvPr>
@@ -4281,8 +4281,8 @@
         </p:nvSpPr>
         <p:spPr>
           <a:xfrm>
-            <a:off x="1175142" y="794172"/>
-            <a:ext cx="2402366" cy="2115890"/>
+            <a:off x="5454577" y="298666"/>
+            <a:ext cx="1767807" cy="2634829"/>
           </a:xfrm>
           <a:prstGeom prst="rect">
             <a:avLst/>
@@ -4326,10 +4326,10 @@
       </p:sp>
       <p:sp>
         <p:nvSpPr>
-          <p:cNvPr id="5" name="Rectangle 4">
-            <a:extLst>
-              <a:ext uri="{FF2B5EF4-FFF2-40B4-BE49-F238E27FC236}">
-                <a16:creationId xmlns:a16="http://schemas.microsoft.com/office/drawing/2014/main" id="{721F1000-881E-4616-99C7-F42F284FBBED}"/>
+          <p:cNvPr id="4" name="Rectangle 3">
+            <a:extLst>
+              <a:ext uri="{FF2B5EF4-FFF2-40B4-BE49-F238E27FC236}">
+                <a16:creationId xmlns:a16="http://schemas.microsoft.com/office/drawing/2014/main" id="{29531341-C931-45A9-83CC-96BA45870DDF}"/>
               </a:ext>
             </a:extLst>
           </p:cNvPr>
@@ -4338,12 +4338,23 @@
         </p:nvSpPr>
         <p:spPr>
           <a:xfrm>
-            <a:off x="2258661" y="1731978"/>
-            <a:ext cx="1148159" cy="266978"/>
+            <a:off x="1175142" y="794172"/>
+            <a:ext cx="2402366" cy="2115890"/>
           </a:xfrm>
           <a:prstGeom prst="rect">
             <a:avLst/>
           </a:prstGeom>
+          <a:solidFill>
+            <a:schemeClr val="accent1">
+              <a:lumMod val="60000"/>
+              <a:lumOff val="40000"/>
+            </a:schemeClr>
+          </a:solidFill>
+          <a:ln w="31750">
+            <a:solidFill>
+              <a:schemeClr val="accent1"/>
+            </a:solidFill>
+          </a:ln>
         </p:spPr>
         <p:style>
           <a:lnRef idx="2">
@@ -4366,51 +4377,16 @@
           <a:lstStyle/>
           <a:p>
             <a:pPr algn="ctr"/>
-            <a:endParaRPr lang="pl-PL"/>
-          </a:p>
-        </p:txBody>
-      </p:sp>
-      <p:sp>
-        <p:nvSpPr>
-          <p:cNvPr id="9" name="TextBox 8">
-            <a:extLst>
-              <a:ext uri="{FF2B5EF4-FFF2-40B4-BE49-F238E27FC236}">
-                <a16:creationId xmlns:a16="http://schemas.microsoft.com/office/drawing/2014/main" id="{767A796D-7874-43B8-9302-CEC037124B62}"/>
-              </a:ext>
-            </a:extLst>
-          </p:cNvPr>
-          <p:cNvSpPr txBox="1"/>
-          <p:nvPr/>
-        </p:nvSpPr>
-        <p:spPr>
-          <a:xfrm>
-            <a:off x="1239574" y="1708987"/>
-            <a:ext cx="1016791" cy="338554"/>
-          </a:xfrm>
-          <a:prstGeom prst="rect">
-            <a:avLst/>
-          </a:prstGeom>
-          <a:noFill/>
-        </p:spPr>
-        <p:txBody>
-          <a:bodyPr wrap="square" rtlCol="0">
-            <a:spAutoFit/>
-          </a:bodyPr>
-          <a:lstStyle/>
-          <a:p>
-            <a:r>
-              <a:rPr lang="en-US" sz="1600" dirty="0"/>
-              <a:t>Nickname</a:t>
-            </a:r>
-          </a:p>
-        </p:txBody>
-      </p:sp>
-      <p:sp>
-        <p:nvSpPr>
-          <p:cNvPr id="12" name="Rectangle 11">
-            <a:extLst>
-              <a:ext uri="{FF2B5EF4-FFF2-40B4-BE49-F238E27FC236}">
-                <a16:creationId xmlns:a16="http://schemas.microsoft.com/office/drawing/2014/main" id="{6BB93E43-533C-4964-9DC3-47708296758C}"/>
+            <a:endParaRPr lang="pl-PL" dirty="0"/>
+          </a:p>
+        </p:txBody>
+      </p:sp>
+      <p:sp>
+        <p:nvSpPr>
+          <p:cNvPr id="5" name="Rectangle 4">
+            <a:extLst>
+              <a:ext uri="{FF2B5EF4-FFF2-40B4-BE49-F238E27FC236}">
+                <a16:creationId xmlns:a16="http://schemas.microsoft.com/office/drawing/2014/main" id="{721F1000-881E-4616-99C7-F42F284FBBED}"/>
               </a:ext>
             </a:extLst>
           </p:cNvPr>
@@ -4419,8 +4395,8 @@
         </p:nvSpPr>
         <p:spPr>
           <a:xfrm>
-            <a:off x="2048837" y="2509049"/>
-            <a:ext cx="1377747" cy="266978"/>
+            <a:off x="2258661" y="1731978"/>
+            <a:ext cx="1148159" cy="266978"/>
           </a:xfrm>
           <a:prstGeom prst="rect">
             <a:avLst/>
@@ -4447,16 +4423,16 @@
           <a:lstStyle/>
           <a:p>
             <a:pPr algn="ctr"/>
-            <a:endParaRPr lang="pl-PL" dirty="0"/>
-          </a:p>
-        </p:txBody>
-      </p:sp>
-      <p:sp>
-        <p:nvSpPr>
-          <p:cNvPr id="13" name="TextBox 12">
-            <a:extLst>
-              <a:ext uri="{FF2B5EF4-FFF2-40B4-BE49-F238E27FC236}">
-                <a16:creationId xmlns:a16="http://schemas.microsoft.com/office/drawing/2014/main" id="{9B47C71B-D2DD-47DB-9C44-A4C1A374BE4D}"/>
+            <a:endParaRPr lang="pl-PL"/>
+          </a:p>
+        </p:txBody>
+      </p:sp>
+      <p:sp>
+        <p:nvSpPr>
+          <p:cNvPr id="9" name="TextBox 8">
+            <a:extLst>
+              <a:ext uri="{FF2B5EF4-FFF2-40B4-BE49-F238E27FC236}">
+                <a16:creationId xmlns:a16="http://schemas.microsoft.com/office/drawing/2014/main" id="{767A796D-7874-43B8-9302-CEC037124B62}"/>
               </a:ext>
             </a:extLst>
           </p:cNvPr>
@@ -4465,8 +4441,8 @@
         </p:nvSpPr>
         <p:spPr>
           <a:xfrm>
-            <a:off x="2048837" y="2512458"/>
-            <a:ext cx="1377748" cy="276999"/>
+            <a:off x="1239574" y="1708987"/>
+            <a:ext cx="1016791" cy="338554"/>
           </a:xfrm>
           <a:prstGeom prst="rect">
             <a:avLst/>
@@ -4480,18 +4456,18 @@
           <a:lstStyle/>
           <a:p>
             <a:r>
-              <a:rPr lang="en-US" sz="1200" dirty="0"/>
-              <a:t>Show leaderboard</a:t>
-            </a:r>
-          </a:p>
-        </p:txBody>
-      </p:sp>
-      <p:sp>
-        <p:nvSpPr>
-          <p:cNvPr id="14" name="Rectangle 13">
-            <a:extLst>
-              <a:ext uri="{FF2B5EF4-FFF2-40B4-BE49-F238E27FC236}">
-                <a16:creationId xmlns:a16="http://schemas.microsoft.com/office/drawing/2014/main" id="{B91E746D-4FC7-4245-9F78-BA2525F744A9}"/>
+              <a:rPr lang="en-US" sz="1600" dirty="0"/>
+              <a:t>Nickname</a:t>
+            </a:r>
+          </a:p>
+        </p:txBody>
+      </p:sp>
+      <p:sp>
+        <p:nvSpPr>
+          <p:cNvPr id="12" name="Rectangle 11">
+            <a:extLst>
+              <a:ext uri="{FF2B5EF4-FFF2-40B4-BE49-F238E27FC236}">
+                <a16:creationId xmlns:a16="http://schemas.microsoft.com/office/drawing/2014/main" id="{6BB93E43-533C-4964-9DC3-47708296758C}"/>
               </a:ext>
             </a:extLst>
           </p:cNvPr>
@@ -4500,23 +4476,12 @@
         </p:nvSpPr>
         <p:spPr>
           <a:xfrm>
-            <a:off x="5454577" y="275233"/>
-            <a:ext cx="1767807" cy="2634829"/>
+            <a:off x="2048837" y="2509049"/>
+            <a:ext cx="1377747" cy="266978"/>
           </a:xfrm>
           <a:prstGeom prst="rect">
             <a:avLst/>
           </a:prstGeom>
-          <a:solidFill>
-            <a:schemeClr val="accent1">
-              <a:lumMod val="60000"/>
-              <a:lumOff val="40000"/>
-            </a:schemeClr>
-          </a:solidFill>
-          <a:ln w="31750">
-            <a:solidFill>
-              <a:schemeClr val="accent1"/>
-            </a:solidFill>
-          </a:ln>
         </p:spPr>
         <p:style>
           <a:lnRef idx="2">
@@ -4540,6 +4505,41 @@
           <a:p>
             <a:pPr algn="ctr"/>
             <a:endParaRPr lang="pl-PL" dirty="0"/>
+          </a:p>
+        </p:txBody>
+      </p:sp>
+      <p:sp>
+        <p:nvSpPr>
+          <p:cNvPr id="13" name="TextBox 12">
+            <a:extLst>
+              <a:ext uri="{FF2B5EF4-FFF2-40B4-BE49-F238E27FC236}">
+                <a16:creationId xmlns:a16="http://schemas.microsoft.com/office/drawing/2014/main" id="{9B47C71B-D2DD-47DB-9C44-A4C1A374BE4D}"/>
+              </a:ext>
+            </a:extLst>
+          </p:cNvPr>
+          <p:cNvSpPr txBox="1"/>
+          <p:nvPr/>
+        </p:nvSpPr>
+        <p:spPr>
+          <a:xfrm>
+            <a:off x="2048837" y="2512458"/>
+            <a:ext cx="1377748" cy="276999"/>
+          </a:xfrm>
+          <a:prstGeom prst="rect">
+            <a:avLst/>
+          </a:prstGeom>
+          <a:noFill/>
+        </p:spPr>
+        <p:txBody>
+          <a:bodyPr wrap="square" rtlCol="0">
+            <a:spAutoFit/>
+          </a:bodyPr>
+          <a:lstStyle/>
+          <a:p>
+            <a:r>
+              <a:rPr lang="en-US" sz="1200" dirty="0"/>
+              <a:t>Show leaderboard</a:t>
+            </a:r>
           </a:p>
         </p:txBody>
       </p:sp>

</xml_diff>